<commit_message>
sửa Class và thêm mã giả vào phương thức có thuật toán khó hiểu
</commit_message>
<xml_diff>
--- a/Document/ThuyetTrinh.pptx
+++ b/Document/ThuyetTrinh.pptx
@@ -7182,7 +7182,7 @@
             <a:fld id="{B61BEF0D-F0BB-DE4B-95CE-6DB70DBA9567}" type="datetimeFigureOut">
               <a:rPr lang="en-US" smtClean="0"/>
               <a:pPr/>
-              <a:t>11/29/2019</a:t>
+              <a:t>11/30/2019</a:t>
             </a:fld>
             <a:endParaRPr lang="en-US" dirty="0"/>
           </a:p>
@@ -7446,7 +7446,7 @@
             <a:fld id="{B61BEF0D-F0BB-DE4B-95CE-6DB70DBA9567}" type="datetimeFigureOut">
               <a:rPr lang="en-US" smtClean="0"/>
               <a:pPr/>
-              <a:t>11/29/2019</a:t>
+              <a:t>11/30/2019</a:t>
             </a:fld>
             <a:endParaRPr lang="en-US" dirty="0"/>
           </a:p>
@@ -7683,7 +7683,7 @@
             <a:fld id="{B61BEF0D-F0BB-DE4B-95CE-6DB70DBA9567}" type="datetimeFigureOut">
               <a:rPr lang="en-US" smtClean="0"/>
               <a:pPr/>
-              <a:t>11/29/2019</a:t>
+              <a:t>11/30/2019</a:t>
             </a:fld>
             <a:endParaRPr lang="en-US" dirty="0"/>
           </a:p>
@@ -7925,7 +7925,7 @@
             <a:fld id="{B61BEF0D-F0BB-DE4B-95CE-6DB70DBA9567}" type="datetimeFigureOut">
               <a:rPr lang="en-US" smtClean="0"/>
               <a:pPr/>
-              <a:t>11/29/2019</a:t>
+              <a:t>11/30/2019</a:t>
             </a:fld>
             <a:endParaRPr lang="en-US" dirty="0"/>
           </a:p>
@@ -8234,7 +8234,7 @@
             <a:fld id="{B61BEF0D-F0BB-DE4B-95CE-6DB70DBA9567}" type="datetimeFigureOut">
               <a:rPr lang="en-US" smtClean="0"/>
               <a:pPr/>
-              <a:t>11/29/2019</a:t>
+              <a:t>11/30/2019</a:t>
             </a:fld>
             <a:endParaRPr lang="en-US" dirty="0"/>
           </a:p>
@@ -8538,7 +8538,7 @@
             <a:fld id="{B61BEF0D-F0BB-DE4B-95CE-6DB70DBA9567}" type="datetimeFigureOut">
               <a:rPr lang="en-US" smtClean="0"/>
               <a:pPr/>
-              <a:t>11/29/2019</a:t>
+              <a:t>11/30/2019</a:t>
             </a:fld>
             <a:endParaRPr lang="en-US" dirty="0"/>
           </a:p>
@@ -8962,7 +8962,7 @@
             <a:fld id="{B61BEF0D-F0BB-DE4B-95CE-6DB70DBA9567}" type="datetimeFigureOut">
               <a:rPr lang="en-US" smtClean="0"/>
               <a:pPr/>
-              <a:t>11/29/2019</a:t>
+              <a:t>11/30/2019</a:t>
             </a:fld>
             <a:endParaRPr lang="en-US" dirty="0"/>
           </a:p>
@@ -9059,7 +9059,7 @@
             <a:fld id="{B61BEF0D-F0BB-DE4B-95CE-6DB70DBA9567}" type="datetimeFigureOut">
               <a:rPr lang="en-US" smtClean="0"/>
               <a:pPr/>
-              <a:t>11/29/2019</a:t>
+              <a:t>11/30/2019</a:t>
             </a:fld>
             <a:endParaRPr lang="en-US" dirty="0"/>
           </a:p>
@@ -9223,7 +9223,7 @@
             <a:fld id="{B61BEF0D-F0BB-DE4B-95CE-6DB70DBA9567}" type="datetimeFigureOut">
               <a:rPr lang="en-US" smtClean="0"/>
               <a:pPr/>
-              <a:t>11/29/2019</a:t>
+              <a:t>11/30/2019</a:t>
             </a:fld>
             <a:endParaRPr lang="en-US" dirty="0"/>
           </a:p>
@@ -9603,7 +9603,7 @@
             <a:fld id="{B61BEF0D-F0BB-DE4B-95CE-6DB70DBA9567}" type="datetimeFigureOut">
               <a:rPr lang="en-US" smtClean="0"/>
               <a:pPr/>
-              <a:t>11/29/2019</a:t>
+              <a:t>11/30/2019</a:t>
             </a:fld>
             <a:endParaRPr lang="en-US" dirty="0"/>
           </a:p>
@@ -9894,7 +9894,7 @@
             <a:fld id="{B61BEF0D-F0BB-DE4B-95CE-6DB70DBA9567}" type="datetimeFigureOut">
               <a:rPr lang="en-US" smtClean="0"/>
               <a:pPr/>
-              <a:t>11/29/2019</a:t>
+              <a:t>11/30/2019</a:t>
             </a:fld>
             <a:endParaRPr lang="en-US" dirty="0"/>
           </a:p>
@@ -10107,7 +10107,7 @@
             <a:fld id="{B61BEF0D-F0BB-DE4B-95CE-6DB70DBA9567}" type="datetimeFigureOut">
               <a:rPr lang="en-US" smtClean="0"/>
               <a:pPr/>
-              <a:t>11/29/2019</a:t>
+              <a:t>11/30/2019</a:t>
             </a:fld>
             <a:endParaRPr lang="en-US" dirty="0"/>
           </a:p>
@@ -13555,13 +13555,13 @@
   <p:clrMapOvr>
     <a:masterClrMapping/>
   </p:clrMapOvr>
-  <mc:AlternateContent xmlns:mc="http://schemas.openxmlformats.org/markup-compatibility/2006">
-    <mc:Choice xmlns:p15="http://schemas.microsoft.com/office/powerpoint/2012/main" Requires="p15">
+  <mc:AlternateContent xmlns:mc="http://schemas.openxmlformats.org/markup-compatibility/2006" xmlns:p15="http://schemas.microsoft.com/office/powerpoint/2012/main">
+    <mc:Choice Requires="p15">
       <p:transition xmlns:p14="http://schemas.microsoft.com/office/powerpoint/2010/main" spd="slow" p14:dur="2000">
         <p15:prstTrans prst="fracture"/>
       </p:transition>
     </mc:Choice>
-    <mc:Fallback>
+    <mc:Fallback xmlns="">
       <p:transition spd="slow">
         <p:fade/>
       </p:transition>
@@ -17702,10 +17702,10 @@
       </p:sp>
       <p:pic>
         <p:nvPicPr>
-          <p:cNvPr id="14" name="Picture 13">
+          <p:cNvPr id="15" name="Picture 14">
             <a:extLst>
               <a:ext uri="{FF2B5EF4-FFF2-40B4-BE49-F238E27FC236}">
-                <a16:creationId xmlns:a16="http://schemas.microsoft.com/office/drawing/2014/main" id="{E21DED3C-3077-4D27-A616-A725F58CF8F3}"/>
+                <a16:creationId xmlns:a16="http://schemas.microsoft.com/office/drawing/2014/main" id="{45DC7649-6EA7-4CBA-919E-A7B3665B8A04}"/>
               </a:ext>
             </a:extLst>
           </p:cNvPr>
@@ -17722,37 +17722,7 @@
         </p:blipFill>
         <p:spPr>
           <a:xfrm>
-            <a:off x="2435684" y="2006657"/>
-            <a:ext cx="6817329" cy="4149187"/>
-          </a:xfrm>
-          <a:prstGeom prst="rect">
-            <a:avLst/>
-          </a:prstGeom>
-        </p:spPr>
-      </p:pic>
-      <p:pic>
-        <p:nvPicPr>
-          <p:cNvPr id="15" name="Picture 14">
-            <a:extLst>
-              <a:ext uri="{FF2B5EF4-FFF2-40B4-BE49-F238E27FC236}">
-                <a16:creationId xmlns:a16="http://schemas.microsoft.com/office/drawing/2014/main" id="{45DC7649-6EA7-4CBA-919E-A7B3665B8A04}"/>
-              </a:ext>
-            </a:extLst>
-          </p:cNvPr>
-          <p:cNvPicPr>
-            <a:picLocks noChangeAspect="1"/>
-          </p:cNvPicPr>
-          <p:nvPr/>
-        </p:nvPicPr>
-        <p:blipFill>
-          <a:blip r:embed="rId3"/>
-          <a:stretch>
-            <a:fillRect/>
-          </a:stretch>
-        </p:blipFill>
-        <p:spPr>
-          <a:xfrm>
-            <a:off x="1098958" y="1966577"/>
+            <a:off x="1268582" y="1997162"/>
             <a:ext cx="9654835" cy="4158682"/>
           </a:xfrm>
           <a:prstGeom prst="rect">
@@ -17791,7 +17761,7 @@
                             </p:stCondLst>
                             <p:childTnLst>
                               <p:par>
-                                <p:cTn id="5" presetID="6" presetClass="entr" presetSubtype="16" fill="hold" nodeType="clickEffect">
+                                <p:cTn id="5" presetID="16" presetClass="entr" presetSubtype="21" fill="hold" nodeType="clickEffect">
                                   <p:stCondLst>
                                     <p:cond delay="0"/>
                                   </p:stCondLst>
@@ -17799,59 +17769,6 @@
                                     <p:set>
                                       <p:cBhvr>
                                         <p:cTn id="6" dur="1" fill="hold">
-                                          <p:stCondLst>
-                                            <p:cond delay="0"/>
-                                          </p:stCondLst>
-                                        </p:cTn>
-                                        <p:tgtEl>
-                                          <p:spTgt spid="14"/>
-                                        </p:tgtEl>
-                                        <p:attrNameLst>
-                                          <p:attrName>style.visibility</p:attrName>
-                                        </p:attrNameLst>
-                                      </p:cBhvr>
-                                      <p:to>
-                                        <p:strVal val="visible"/>
-                                      </p:to>
-                                    </p:set>
-                                    <p:animEffect transition="in" filter="circle(in)">
-                                      <p:cBhvr>
-                                        <p:cTn id="7" dur="2000"/>
-                                        <p:tgtEl>
-                                          <p:spTgt spid="14"/>
-                                        </p:tgtEl>
-                                      </p:cBhvr>
-                                    </p:animEffect>
-                                  </p:childTnLst>
-                                </p:cTn>
-                              </p:par>
-                            </p:childTnLst>
-                          </p:cTn>
-                        </p:par>
-                      </p:childTnLst>
-                    </p:cTn>
-                  </p:par>
-                  <p:par>
-                    <p:cTn id="8" fill="hold">
-                      <p:stCondLst>
-                        <p:cond delay="indefinite"/>
-                      </p:stCondLst>
-                      <p:childTnLst>
-                        <p:par>
-                          <p:cTn id="9" fill="hold">
-                            <p:stCondLst>
-                              <p:cond delay="0"/>
-                            </p:stCondLst>
-                            <p:childTnLst>
-                              <p:par>
-                                <p:cTn id="10" presetID="16" presetClass="entr" presetSubtype="21" fill="hold" nodeType="clickEffect">
-                                  <p:stCondLst>
-                                    <p:cond delay="0"/>
-                                  </p:stCondLst>
-                                  <p:childTnLst>
-                                    <p:set>
-                                      <p:cBhvr>
-                                        <p:cTn id="11" dur="1" fill="hold">
                                           <p:stCondLst>
                                             <p:cond delay="0"/>
                                           </p:stCondLst>
@@ -17869,7 +17786,7 @@
                                     </p:set>
                                     <p:animEffect transition="in" filter="barn(inVertical)">
                                       <p:cBhvr>
-                                        <p:cTn id="12" dur="500"/>
+                                        <p:cTn id="7" dur="500"/>
                                         <p:tgtEl>
                                           <p:spTgt spid="15"/>
                                         </p:tgtEl>
@@ -18311,15 +18228,6 @@
 </file>
 
 <file path=customXml/item2.xml><?xml version="1.0" encoding="utf-8"?>
-<?mso-contentType ?>
-<FormTemplates xmlns="http://schemas.microsoft.com/sharepoint/v3/contenttype/forms">
-  <Display>DocumentLibraryForm</Display>
-  <Edit>DocumentLibraryForm</Edit>
-  <New>DocumentLibraryForm</New>
-</FormTemplates>
-</file>
-
-<file path=customXml/item3.xml><?xml version="1.0" encoding="utf-8"?>
 <ct:contentTypeSchema xmlns:ct="http://schemas.microsoft.com/office/2006/metadata/contentType" xmlns:ma="http://schemas.microsoft.com/office/2006/metadata/properties/metaAttributes" ct:_="" ma:_="" ma:contentTypeName="Document" ma:contentTypeID="0x01010079F111ED35F8CC479449609E8A0923A6" ma:contentTypeVersion="11" ma:contentTypeDescription="Create a new document." ma:contentTypeScope="" ma:versionID="1c2eb7a32e66fb6e4260f3771546a5e2">
   <xsd:schema xmlns:xsd="http://www.w3.org/2001/XMLSchema" xmlns:xs="http://www.w3.org/2001/XMLSchema" xmlns:p="http://schemas.microsoft.com/office/2006/metadata/properties" xmlns:ns2="71af3243-3dd4-4a8d-8c0d-dd76da1f02a5" xmlns:ns3="16c05727-aa75-4e4a-9b5f-8a80a1165891" targetNamespace="http://schemas.microsoft.com/office/2006/metadata/properties" ma:root="true" ma:fieldsID="04e1f6479c48b08974ba73b5ca973489" ns2:_="" ns3:_="">
     <xsd:import namespace="71af3243-3dd4-4a8d-8c0d-dd76da1f02a5"/>
@@ -18530,6 +18438,15 @@
 </ct:contentTypeSchema>
 </file>
 
+<file path=customXml/item3.xml><?xml version="1.0" encoding="utf-8"?>
+<?mso-contentType ?>
+<FormTemplates xmlns="http://schemas.microsoft.com/sharepoint/v3/contenttype/forms">
+  <Display>DocumentLibraryForm</Display>
+  <Edit>DocumentLibraryForm</Edit>
+  <New>DocumentLibraryForm</New>
+</FormTemplates>
+</file>
+
 <file path=customXml/itemProps1.xml><?xml version="1.0" encoding="utf-8"?>
 <ds:datastoreItem xmlns:ds="http://schemas.openxmlformats.org/officeDocument/2006/customXml" ds:itemID="{1EBC12AA-1C15-4500-BC9C-8EE83A441DE9}">
   <ds:schemaRefs>
@@ -18548,14 +18465,6 @@
 </file>
 
 <file path=customXml/itemProps2.xml><?xml version="1.0" encoding="utf-8"?>
-<ds:datastoreItem xmlns:ds="http://schemas.openxmlformats.org/officeDocument/2006/customXml" ds:itemID="{BA0CF3B2-1F0F-4FC5-8002-3E4869ABAD55}">
-  <ds:schemaRefs>
-    <ds:schemaRef ds:uri="http://schemas.microsoft.com/sharepoint/v3/contenttype/forms"/>
-  </ds:schemaRefs>
-</ds:datastoreItem>
-</file>
-
-<file path=customXml/itemProps3.xml><?xml version="1.0" encoding="utf-8"?>
 <ds:datastoreItem xmlns:ds="http://schemas.openxmlformats.org/officeDocument/2006/customXml" ds:itemID="{1F69AFF4-BB30-4BA0-AD22-82CC3C43276B}">
   <ds:schemaRefs>
     <ds:schemaRef ds:uri="http://schemas.microsoft.com/office/2006/metadata/contentType"/>
@@ -18572,4 +18481,12 @@
     <ds:schemaRef ds:uri="http://schemas.microsoft.com/internal/obd"/>
   </ds:schemaRefs>
 </ds:datastoreItem>
+</file>
+
+<file path=customXml/itemProps3.xml><?xml version="1.0" encoding="utf-8"?>
+<ds:datastoreItem xmlns:ds="http://schemas.openxmlformats.org/officeDocument/2006/customXml" ds:itemID="{BA0CF3B2-1F0F-4FC5-8002-3E4869ABAD55}">
+  <ds:schemaRefs>
+    <ds:schemaRef ds:uri="http://schemas.microsoft.com/sharepoint/v3/contenttype/forms"/>
+  </ds:schemaRefs>
+</ds:datastoreItem>
 </file>
</xml_diff>